<commit_message>
Add latest discussion to PPT.
</commit_message>
<xml_diff>
--- a/STL/STL_Presentation.pptx
+++ b/STL/STL_Presentation.pptx
@@ -13,7 +13,6 @@
     <p:sldId id="264" r:id="rId7"/>
     <p:sldId id="265" r:id="rId8"/>
     <p:sldId id="266" r:id="rId9"/>
-    <p:sldId id="261" r:id="rId10"/>
   </p:sldIdLst>
   <p:sldSz cx="12192000" cy="6858000"/>
   <p:notesSz cx="6858000" cy="9144000"/>
@@ -3362,31 +3361,6 @@
           </a:p>
         </p:txBody>
       </p:sp>
-      <p:sp>
-        <p:nvSpPr>
-          <p:cNvPr id="3" name="Subtitle 2">
-            <a:extLst>
-              <a:ext uri="{FF2B5EF4-FFF2-40B4-BE49-F238E27FC236}">
-                <a16:creationId xmlns:a16="http://schemas.microsoft.com/office/drawing/2014/main" id="{9DEEBC61-71AA-5F8B-0115-84BF38E7BDE6}"/>
-              </a:ext>
-            </a:extLst>
-          </p:cNvPr>
-          <p:cNvSpPr>
-            <a:spLocks noGrp="1"/>
-          </p:cNvSpPr>
-          <p:nvPr>
-            <p:ph type="subTitle" idx="1"/>
-          </p:nvPr>
-        </p:nvSpPr>
-        <p:spPr/>
-        <p:txBody>
-          <a:bodyPr/>
-          <a:lstStyle/>
-          <a:p>
-            <a:endParaRPr lang="en-US"/>
-          </a:p>
-        </p:txBody>
-      </p:sp>
     </p:spTree>
     <p:extLst>
       <p:ext uri="{BB962C8B-B14F-4D97-AF65-F5344CB8AC3E}">
@@ -3461,7 +3435,12 @@
             <p:ph idx="1"/>
           </p:nvPr>
         </p:nvSpPr>
-        <p:spPr/>
+        <p:spPr>
+          <a:xfrm>
+            <a:off x="838200" y="1825625"/>
+            <a:ext cx="3201955" cy="4351338"/>
+          </a:xfrm>
+        </p:spPr>
         <p:txBody>
           <a:bodyPr/>
           <a:lstStyle/>
@@ -3510,6 +3489,60 @@
           </a:p>
           <a:p>
             <a:endParaRPr lang="en-US" dirty="0"/>
+          </a:p>
+        </p:txBody>
+      </p:sp>
+      <p:sp>
+        <p:nvSpPr>
+          <p:cNvPr id="4" name="TextBox 3">
+            <a:extLst>
+              <a:ext uri="{FF2B5EF4-FFF2-40B4-BE49-F238E27FC236}">
+                <a16:creationId xmlns:a16="http://schemas.microsoft.com/office/drawing/2014/main" id="{E467C893-9420-BEA5-3E87-0A64EBA96C94}"/>
+              </a:ext>
+            </a:extLst>
+          </p:cNvPr>
+          <p:cNvSpPr txBox="1"/>
+          <p:nvPr/>
+        </p:nvSpPr>
+        <p:spPr>
+          <a:xfrm>
+            <a:off x="6096000" y="4385387"/>
+            <a:ext cx="5257800" cy="1200329"/>
+          </a:xfrm>
+          <a:prstGeom prst="rect">
+            <a:avLst/>
+          </a:prstGeom>
+          <a:noFill/>
+        </p:spPr>
+        <p:txBody>
+          <a:bodyPr wrap="square" rtlCol="0">
+            <a:spAutoFit/>
+          </a:bodyPr>
+          <a:lstStyle/>
+          <a:p>
+            <a:r>
+              <a:rPr lang="en-US" dirty="0"/>
+              <a:t>- General Description</a:t>
+            </a:r>
+          </a:p>
+          <a:p>
+            <a:r>
+              <a:rPr lang="en-US" dirty="0"/>
+              <a:t>- Interesting member functions and related topics</a:t>
+            </a:r>
+          </a:p>
+          <a:p>
+            <a:r>
+              <a:rPr lang="en-US" dirty="0"/>
+              <a:t>- Time Complexity</a:t>
+            </a:r>
+          </a:p>
+          <a:p>
+            <a:r>
+              <a:rPr lang="en-US" dirty="0"/>
+              <a:t>- Comparison with Python</a:t>
+            </a:r>
+            <a:endParaRPr lang="en-GB" dirty="0"/>
           </a:p>
         </p:txBody>
       </p:sp>
@@ -3571,7 +3604,7 @@
           <a:p>
             <a:r>
               <a:rPr lang="en-US" dirty="0"/>
-              <a:t>Std::vector</a:t>
+              <a:t>vector</a:t>
             </a:r>
           </a:p>
         </p:txBody>
@@ -3838,13 +3871,13 @@
           <a:p>
             <a:r>
               <a:rPr lang="en-US" dirty="0"/>
-              <a:t>Std::vector</a:t>
-            </a:r>
-          </a:p>
-        </p:txBody>
-      </p:sp>
-      <mc:AlternateContent xmlns:mc="http://schemas.openxmlformats.org/markup-compatibility/2006">
-        <mc:Choice xmlns:a14="http://schemas.microsoft.com/office/drawing/2010/main" Requires="a14">
+              <a:t>vector</a:t>
+            </a:r>
+          </a:p>
+        </p:txBody>
+      </p:sp>
+      <mc:AlternateContent xmlns:mc="http://schemas.openxmlformats.org/markup-compatibility/2006" xmlns:a14="http://schemas.microsoft.com/office/drawing/2010/main">
+        <mc:Choice Requires="a14">
           <p:sp>
             <p:nvSpPr>
               <p:cNvPr id="3" name="Content Placeholder 2">
@@ -4115,7 +4148,7 @@
             </p:txBody>
           </p:sp>
         </mc:Choice>
-        <mc:Fallback>
+        <mc:Fallback xmlns="">
           <p:sp>
             <p:nvSpPr>
               <p:cNvPr id="3" name="Content Placeholder 2">
@@ -4303,7 +4336,7 @@
             <a:pPr lvl="2"/>
             <a:r>
               <a:rPr lang="en-GB" dirty="0"/>
-              <a:t>Easier initialisation for string</a:t>
+              <a:t>Easier initialisation and functions for string</a:t>
             </a:r>
           </a:p>
           <a:p>
@@ -4326,6 +4359,13 @@
             </a:r>
           </a:p>
           <a:p>
+            <a:pPr lvl="2"/>
+            <a:r>
+              <a:rPr lang="en-GB" dirty="0"/>
+              <a:t>??</a:t>
+            </a:r>
+          </a:p>
+          <a:p>
             <a:pPr lvl="1"/>
             <a:endParaRPr lang="en-GB" dirty="0"/>
           </a:p>
@@ -4341,7 +4381,7 @@
             </a:r>
             <a:r>
               <a:rPr lang="en-US" dirty="0" err="1"/>
-              <a:t>std:stiring</a:t>
+              <a:t>std:string</a:t>
             </a:r>
             <a:r>
               <a:rPr lang="en-US" dirty="0"/>
@@ -4490,7 +4530,21 @@
             <a:pPr lvl="1"/>
             <a:r>
               <a:rPr lang="en-GB" dirty="0"/>
-              <a:t>Iterator invalidation ??</a:t>
+              <a:t>Iterator invalidation –</a:t>
+            </a:r>
+          </a:p>
+          <a:p>
+            <a:pPr lvl="2"/>
+            <a:r>
+              <a:rPr lang="en-GB" dirty="0"/>
+              <a:t>??</a:t>
+            </a:r>
+          </a:p>
+          <a:p>
+            <a:pPr lvl="2"/>
+            <a:r>
+              <a:rPr lang="en-GB" dirty="0"/>
+              <a:t>Unable to reproduce in code.</a:t>
             </a:r>
           </a:p>
           <a:p>
@@ -4766,1494 +4820,61 @@
           <a:lstStyle/>
           <a:p>
             <a:r>
-              <a:rPr lang="en-GB" dirty="0"/>
-              <a:t>Elements stored  as a dictionary without any </a:t>
-            </a:r>
-            <a:r>
-              <a:rPr lang="en-GB"/>
-              <a:t>order.</a:t>
-            </a:r>
+              <a:rPr lang="en-US" dirty="0"/>
+              <a:t>??</a:t>
+            </a:r>
+          </a:p>
+          <a:p>
+            <a:r>
+              <a:rPr lang="en-US" dirty="0"/>
+              <a:t>Class Template</a:t>
+            </a:r>
+          </a:p>
+          <a:p>
+            <a:r>
+              <a:rPr lang="en-US" dirty="0"/>
+              <a:t>Manages a value that may or may not be present.</a:t>
+            </a:r>
+          </a:p>
+          <a:p>
             <a:endParaRPr lang="en-GB" dirty="0"/>
           </a:p>
         </p:txBody>
       </p:sp>
+      <p:pic>
+        <p:nvPicPr>
+          <p:cNvPr id="5" name="Picture 4">
+            <a:extLst>
+              <a:ext uri="{FF2B5EF4-FFF2-40B4-BE49-F238E27FC236}">
+                <a16:creationId xmlns:a16="http://schemas.microsoft.com/office/drawing/2014/main" id="{15F35BBA-749B-99D0-DD21-D939C9EA9F8A}"/>
+              </a:ext>
+            </a:extLst>
+          </p:cNvPr>
+          <p:cNvPicPr>
+            <a:picLocks noChangeAspect="1"/>
+          </p:cNvPicPr>
+          <p:nvPr/>
+        </p:nvPicPr>
+        <p:blipFill>
+          <a:blip r:embed="rId2"/>
+          <a:stretch>
+            <a:fillRect/>
+          </a:stretch>
+        </p:blipFill>
+        <p:spPr>
+          <a:xfrm>
+            <a:off x="3983551" y="3840346"/>
+            <a:ext cx="7487695" cy="1324160"/>
+          </a:xfrm>
+          <a:prstGeom prst="rect">
+            <a:avLst/>
+          </a:prstGeom>
+        </p:spPr>
+      </p:pic>
     </p:spTree>
     <p:extLst>
       <p:ext uri="{BB962C8B-B14F-4D97-AF65-F5344CB8AC3E}">
         <p14:creationId xmlns:p14="http://schemas.microsoft.com/office/powerpoint/2010/main" val="3384942037"/>
-      </p:ext>
-    </p:extLst>
-  </p:cSld>
-  <p:clrMapOvr>
-    <a:masterClrMapping/>
-  </p:clrMapOvr>
-</p:sld>
-</file>
-
-<file path=ppt/slides/slide9.xml><?xml version="1.0" encoding="utf-8"?>
-<p:sld xmlns:a="http://schemas.openxmlformats.org/drawingml/2006/main" xmlns:r="http://schemas.openxmlformats.org/officeDocument/2006/relationships" xmlns:p="http://schemas.openxmlformats.org/presentationml/2006/main">
-  <p:cSld>
-    <p:spTree>
-      <p:nvGrpSpPr>
-        <p:cNvPr id="1" name=""/>
-        <p:cNvGrpSpPr/>
-        <p:nvPr/>
-      </p:nvGrpSpPr>
-      <p:grpSpPr>
-        <a:xfrm>
-          <a:off x="0" y="0"/>
-          <a:ext cx="0" cy="0"/>
-          <a:chOff x="0" y="0"/>
-          <a:chExt cx="0" cy="0"/>
-        </a:xfrm>
-      </p:grpSpPr>
-      <p:sp>
-        <p:nvSpPr>
-          <p:cNvPr id="2" name="Title 1">
-            <a:extLst>
-              <a:ext uri="{FF2B5EF4-FFF2-40B4-BE49-F238E27FC236}">
-                <a16:creationId xmlns:a16="http://schemas.microsoft.com/office/drawing/2014/main" id="{7E9F02AB-00A8-F204-A938-6ECB39CC53F6}"/>
-              </a:ext>
-            </a:extLst>
-          </p:cNvPr>
-          <p:cNvSpPr>
-            <a:spLocks noGrp="1"/>
-          </p:cNvSpPr>
-          <p:nvPr>
-            <p:ph type="title"/>
-          </p:nvPr>
-        </p:nvSpPr>
-        <p:spPr/>
-        <p:txBody>
-          <a:bodyPr/>
-          <a:lstStyle/>
-          <a:p>
-            <a:r>
-              <a:rPr lang="en-US" dirty="0"/>
-              <a:t>Reference</a:t>
-            </a:r>
-          </a:p>
-        </p:txBody>
-      </p:sp>
-      <p:graphicFrame>
-        <p:nvGraphicFramePr>
-          <p:cNvPr id="5" name="Table 5">
-            <a:extLst>
-              <a:ext uri="{FF2B5EF4-FFF2-40B4-BE49-F238E27FC236}">
-                <a16:creationId xmlns:a16="http://schemas.microsoft.com/office/drawing/2014/main" id="{A8541E07-6D5C-700F-F710-AE59D6B95A3B}"/>
-              </a:ext>
-            </a:extLst>
-          </p:cNvPr>
-          <p:cNvGraphicFramePr>
-            <a:graphicFrameLocks noGrp="1"/>
-          </p:cNvGraphicFramePr>
-          <p:nvPr>
-            <p:ph idx="1"/>
-            <p:extLst>
-              <p:ext uri="{D42A27DB-BD31-4B8C-83A1-F6EECF244321}">
-                <p14:modId xmlns:p14="http://schemas.microsoft.com/office/powerpoint/2010/main" val="2014594132"/>
-              </p:ext>
-            </p:extLst>
-          </p:nvPr>
-        </p:nvGraphicFramePr>
-        <p:xfrm>
-          <a:off x="838200" y="1825625"/>
-          <a:ext cx="10663518" cy="4028440"/>
-        </p:xfrm>
-        <a:graphic>
-          <a:graphicData uri="http://schemas.openxmlformats.org/drawingml/2006/table">
-            <a:tbl>
-              <a:tblPr firstRow="1" bandRow="1">
-                <a:tableStyleId>{21E4AEA4-8DFA-4A89-87EB-49C32662AFE0}</a:tableStyleId>
-              </a:tblPr>
-              <a:tblGrid>
-                <a:gridCol w="4974091">
-                  <a:extLst>
-                    <a:ext uri="{9D8B030D-6E8A-4147-A177-3AD203B41FA5}">
-                      <a16:colId xmlns:a16="http://schemas.microsoft.com/office/drawing/2014/main" val="3965392556"/>
-                    </a:ext>
-                  </a:extLst>
-                </a:gridCol>
-                <a:gridCol w="5689427">
-                  <a:extLst>
-                    <a:ext uri="{9D8B030D-6E8A-4147-A177-3AD203B41FA5}">
-                      <a16:colId xmlns:a16="http://schemas.microsoft.com/office/drawing/2014/main" val="711243295"/>
-                    </a:ext>
-                  </a:extLst>
-                </a:gridCol>
-              </a:tblGrid>
-              <a:tr h="370840">
-                <a:tc>
-                  <a:txBody>
-                    <a:bodyPr/>
-                    <a:lstStyle/>
-                    <a:p>
-                      <a:pPr>
-                        <a:lnSpc>
-                          <a:spcPct val="150000"/>
-                        </a:lnSpc>
-                      </a:pPr>
-                      <a:r>
-                        <a:rPr lang="en-US" sz="1000" b="1" kern="1200" dirty="0">
-                          <a:solidFill>
-                            <a:schemeClr val="dk1"/>
-                          </a:solidFill>
-                          <a:latin typeface="+mn-lt"/>
-                          <a:ea typeface="+mn-ea"/>
-                          <a:cs typeface="+mn-cs"/>
-                        </a:rPr>
-                        <a:t>STL</a:t>
-                      </a:r>
-                    </a:p>
-                    <a:p>
-                      <a:r>
-                        <a:rPr lang="en-US" sz="1000" b="1" dirty="0">
-                          <a:hlinkClick r:id="rId2"/>
-                        </a:rPr>
-                        <a:t>https://stackoverflow.com/a/2826347/4168707</a:t>
-                      </a:r>
-                      <a:endParaRPr lang="en-US" sz="1000" b="1" dirty="0"/>
-                    </a:p>
-                    <a:p>
-                      <a:endParaRPr lang="en-US" sz="1000" b="1" dirty="0"/>
-                    </a:p>
-                  </a:txBody>
-                  <a:tcPr>
-                    <a:lnL w="12700" cap="flat" cmpd="sng" algn="ctr">
-                      <a:solidFill>
-                        <a:schemeClr val="tx1"/>
-                      </a:solidFill>
-                      <a:prstDash val="solid"/>
-                      <a:round/>
-                      <a:headEnd type="none" w="med" len="med"/>
-                      <a:tailEnd type="none" w="med" len="med"/>
-                    </a:lnL>
-                    <a:lnR w="12700" cap="flat" cmpd="sng" algn="ctr">
-                      <a:solidFill>
-                        <a:schemeClr val="tx1"/>
-                      </a:solidFill>
-                      <a:prstDash val="solid"/>
-                      <a:round/>
-                      <a:headEnd type="none" w="med" len="med"/>
-                      <a:tailEnd type="none" w="med" len="med"/>
-                    </a:lnR>
-                    <a:lnT w="12700" cap="flat" cmpd="sng" algn="ctr">
-                      <a:solidFill>
-                        <a:schemeClr val="tx1"/>
-                      </a:solidFill>
-                      <a:prstDash val="solid"/>
-                      <a:round/>
-                      <a:headEnd type="none" w="med" len="med"/>
-                      <a:tailEnd type="none" w="med" len="med"/>
-                    </a:lnT>
-                    <a:lnB w="12700" cap="flat" cmpd="sng" algn="ctr">
-                      <a:solidFill>
-                        <a:schemeClr val="tx1"/>
-                      </a:solidFill>
-                      <a:prstDash val="solid"/>
-                      <a:round/>
-                      <a:headEnd type="none" w="med" len="med"/>
-                      <a:tailEnd type="none" w="med" len="med"/>
-                    </a:lnB>
-                    <a:lnTlToBr w="12700" cmpd="sng">
-                      <a:noFill/>
-                      <a:prstDash val="solid"/>
-                    </a:lnTlToBr>
-                    <a:lnBlToTr w="12700" cmpd="sng">
-                      <a:noFill/>
-                      <a:prstDash val="solid"/>
-                    </a:lnBlToTr>
-                    <a:solidFill>
-                      <a:schemeClr val="accent4">
-                        <a:lumMod val="40000"/>
-                        <a:lumOff val="60000"/>
-                      </a:schemeClr>
-                    </a:solidFill>
-                  </a:tcPr>
-                </a:tc>
-                <a:tc>
-                  <a:txBody>
-                    <a:bodyPr/>
-                    <a:lstStyle/>
-                    <a:p>
-                      <a:pPr marL="0" indent="0" algn="l" defTabSz="914400" rtl="0" eaLnBrk="1" latinLnBrk="0" hangingPunct="1">
-                        <a:lnSpc>
-                          <a:spcPct val="150000"/>
-                        </a:lnSpc>
-                        <a:buNone/>
-                        <a:defRPr/>
-                      </a:pPr>
-                      <a:r>
-                        <a:rPr lang="en-US" sz="1000" b="1" kern="1200" dirty="0">
-                          <a:solidFill>
-                            <a:schemeClr val="dk1"/>
-                          </a:solidFill>
-                          <a:latin typeface="+mn-lt"/>
-                          <a:ea typeface="+mn-ea"/>
-                          <a:cs typeface="+mn-cs"/>
-                        </a:rPr>
-                        <a:t>Memory management Python</a:t>
-                      </a:r>
-                    </a:p>
-                    <a:p>
-                      <a:pPr marL="0" indent="0">
-                        <a:buNone/>
-                        <a:defRPr/>
-                      </a:pPr>
-                      <a:r>
-                        <a:rPr lang="en-US" sz="1000" b="1" dirty="0">
-                          <a:solidFill>
-                            <a:prstClr val="black"/>
-                          </a:solidFill>
-                          <a:hlinkClick r:id="rId3"/>
-                        </a:rPr>
-                        <a:t>https://bit.ly/3EQHoxH</a:t>
-                      </a:r>
-                    </a:p>
-                    <a:p>
-                      <a:pPr marL="0" indent="0">
-                        <a:buNone/>
-                        <a:defRPr/>
-                      </a:pPr>
-                      <a:r>
-                        <a:rPr lang="en-US" sz="1000" b="1" dirty="0">
-                          <a:solidFill>
-                            <a:prstClr val="black"/>
-                          </a:solidFill>
-                          <a:hlinkClick r:id="rId3"/>
-                        </a:rPr>
-                        <a:t>https://stackoverflow.com/a/68637039/4168707</a:t>
-                      </a:r>
-                      <a:endParaRPr lang="en-US" sz="1000" b="1" dirty="0">
-                        <a:solidFill>
-                          <a:prstClr val="black"/>
-                        </a:solidFill>
-                      </a:endParaRPr>
-                    </a:p>
-                  </a:txBody>
-                  <a:tcPr>
-                    <a:lnL w="12700" cap="flat" cmpd="sng" algn="ctr">
-                      <a:solidFill>
-                        <a:schemeClr val="tx1"/>
-                      </a:solidFill>
-                      <a:prstDash val="solid"/>
-                      <a:round/>
-                      <a:headEnd type="none" w="med" len="med"/>
-                      <a:tailEnd type="none" w="med" len="med"/>
-                    </a:lnL>
-                    <a:lnR w="12700" cap="flat" cmpd="sng" algn="ctr">
-                      <a:solidFill>
-                        <a:schemeClr val="tx1"/>
-                      </a:solidFill>
-                      <a:prstDash val="solid"/>
-                      <a:round/>
-                      <a:headEnd type="none" w="med" len="med"/>
-                      <a:tailEnd type="none" w="med" len="med"/>
-                    </a:lnR>
-                    <a:lnT w="12700" cap="flat" cmpd="sng" algn="ctr">
-                      <a:solidFill>
-                        <a:schemeClr val="tx1"/>
-                      </a:solidFill>
-                      <a:prstDash val="solid"/>
-                      <a:round/>
-                      <a:headEnd type="none" w="med" len="med"/>
-                      <a:tailEnd type="none" w="med" len="med"/>
-                    </a:lnT>
-                    <a:lnB w="12700" cap="flat" cmpd="sng" algn="ctr">
-                      <a:solidFill>
-                        <a:schemeClr val="tx1"/>
-                      </a:solidFill>
-                      <a:prstDash val="solid"/>
-                      <a:round/>
-                      <a:headEnd type="none" w="med" len="med"/>
-                      <a:tailEnd type="none" w="med" len="med"/>
-                    </a:lnB>
-                    <a:lnTlToBr w="12700" cmpd="sng">
-                      <a:noFill/>
-                      <a:prstDash val="solid"/>
-                    </a:lnTlToBr>
-                    <a:lnBlToTr w="12700" cmpd="sng">
-                      <a:noFill/>
-                      <a:prstDash val="solid"/>
-                    </a:lnBlToTr>
-                    <a:solidFill>
-                      <a:schemeClr val="accent4">
-                        <a:lumMod val="40000"/>
-                        <a:lumOff val="60000"/>
-                      </a:schemeClr>
-                    </a:solidFill>
-                  </a:tcPr>
-                </a:tc>
-                <a:extLst>
-                  <a:ext uri="{0D108BD9-81ED-4DB2-BD59-A6C34878D82A}">
-                    <a16:rowId xmlns:a16="http://schemas.microsoft.com/office/drawing/2014/main" val="223633179"/>
-                  </a:ext>
-                </a:extLst>
-              </a:tr>
-              <a:tr h="370840">
-                <a:tc>
-                  <a:txBody>
-                    <a:bodyPr/>
-                    <a:lstStyle/>
-                    <a:p>
-                      <a:pPr marL="0" marR="0" lvl="0" indent="0" algn="l" defTabSz="914400" rtl="0" eaLnBrk="1" fontAlgn="auto" latinLnBrk="0" hangingPunct="1">
-                        <a:lnSpc>
-                          <a:spcPct val="150000"/>
-                        </a:lnSpc>
-                        <a:spcBef>
-                          <a:spcPts val="1000"/>
-                        </a:spcBef>
-                        <a:spcAft>
-                          <a:spcPts val="0"/>
-                        </a:spcAft>
-                        <a:buClrTx/>
-                        <a:buSzTx/>
-                        <a:buFont typeface="Arial" panose="020B0604020202020204" pitchFamily="34" charset="0"/>
-                        <a:buNone/>
-                        <a:tabLst/>
-                        <a:defRPr/>
-                      </a:pPr>
-                      <a:r>
-                        <a:rPr lang="en-US" sz="1000" b="1" kern="1200" dirty="0">
-                          <a:solidFill>
-                            <a:schemeClr val="dk1"/>
-                          </a:solidFill>
-                          <a:latin typeface="+mn-lt"/>
-                          <a:ea typeface="+mn-ea"/>
-                          <a:cs typeface="+mn-cs"/>
-                        </a:rPr>
-                        <a:t>Vector</a:t>
-                      </a:r>
-                      <a:endParaRPr lang="en-US" sz="1000" b="1" kern="1200" noProof="0" dirty="0">
-                        <a:solidFill>
-                          <a:schemeClr val="dk1"/>
-                        </a:solidFill>
-                        <a:latin typeface="+mn-lt"/>
-                        <a:ea typeface="+mn-ea"/>
-                        <a:cs typeface="+mn-cs"/>
-                      </a:endParaRPr>
-                    </a:p>
-                    <a:p>
-                      <a:pPr marL="0" indent="0">
-                        <a:buNone/>
-                        <a:defRPr/>
-                      </a:pPr>
-                      <a:r>
-                        <a:rPr kumimoji="0" lang="en-US" sz="1000" b="1" u="none" strike="noStrike" kern="1200" cap="none" spc="0" normalizeH="0" baseline="0" noProof="0" dirty="0">
-                          <a:ln>
-                            <a:noFill/>
-                          </a:ln>
-                          <a:solidFill>
-                            <a:prstClr val="black"/>
-                          </a:solidFill>
-                          <a:effectLst/>
-                          <a:uLnTx/>
-                          <a:uFillTx/>
-                          <a:hlinkClick r:id="rId4"/>
-                        </a:rPr>
-                        <a:t>https://www.geeksforgeeks.org/vector-in-cpp-stl/</a:t>
-                      </a:r>
-                      <a:endParaRPr kumimoji="0" lang="en-US" sz="1000" b="1" i="0" u="none" strike="noStrike" kern="1200" cap="none" spc="0" normalizeH="0" baseline="0" noProof="0" dirty="0">
-                        <a:ln>
-                          <a:noFill/>
-                        </a:ln>
-                        <a:solidFill>
-                          <a:prstClr val="black"/>
-                        </a:solidFill>
-                        <a:effectLst/>
-                        <a:uLnTx/>
-                        <a:uFillTx/>
-                        <a:latin typeface="+mn-lt"/>
-                        <a:ea typeface="+mn-ea"/>
-                        <a:cs typeface="+mn-cs"/>
-                      </a:endParaRPr>
-                    </a:p>
-                  </a:txBody>
-                  <a:tcPr>
-                    <a:lnL w="12700" cap="flat" cmpd="sng" algn="ctr">
-                      <a:solidFill>
-                        <a:schemeClr val="tx1"/>
-                      </a:solidFill>
-                      <a:prstDash val="solid"/>
-                      <a:round/>
-                      <a:headEnd type="none" w="med" len="med"/>
-                      <a:tailEnd type="none" w="med" len="med"/>
-                    </a:lnL>
-                    <a:lnR w="12700" cap="flat" cmpd="sng" algn="ctr">
-                      <a:solidFill>
-                        <a:schemeClr val="tx1"/>
-                      </a:solidFill>
-                      <a:prstDash val="solid"/>
-                      <a:round/>
-                      <a:headEnd type="none" w="med" len="med"/>
-                      <a:tailEnd type="none" w="med" len="med"/>
-                    </a:lnR>
-                    <a:lnT w="12700" cap="flat" cmpd="sng" algn="ctr">
-                      <a:solidFill>
-                        <a:schemeClr val="tx1"/>
-                      </a:solidFill>
-                      <a:prstDash val="solid"/>
-                      <a:round/>
-                      <a:headEnd type="none" w="med" len="med"/>
-                      <a:tailEnd type="none" w="med" len="med"/>
-                    </a:lnT>
-                    <a:lnB w="12700" cap="flat" cmpd="sng" algn="ctr">
-                      <a:solidFill>
-                        <a:schemeClr val="tx1"/>
-                      </a:solidFill>
-                      <a:prstDash val="solid"/>
-                      <a:round/>
-                      <a:headEnd type="none" w="med" len="med"/>
-                      <a:tailEnd type="none" w="med" len="med"/>
-                    </a:lnB>
-                    <a:lnTlToBr w="12700" cmpd="sng">
-                      <a:noFill/>
-                      <a:prstDash val="solid"/>
-                    </a:lnTlToBr>
-                    <a:lnBlToTr w="12700" cmpd="sng">
-                      <a:noFill/>
-                      <a:prstDash val="solid"/>
-                    </a:lnBlToTr>
-                    <a:solidFill>
-                      <a:schemeClr val="accent4">
-                        <a:lumMod val="20000"/>
-                        <a:lumOff val="80000"/>
-                      </a:schemeClr>
-                    </a:solidFill>
-                  </a:tcPr>
-                </a:tc>
-                <a:tc>
-                  <a:txBody>
-                    <a:bodyPr/>
-                    <a:lstStyle/>
-                    <a:p>
-                      <a:pPr marL="0" indent="0" algn="l" defTabSz="914400" rtl="0" eaLnBrk="1" latinLnBrk="0" hangingPunct="1">
-                        <a:lnSpc>
-                          <a:spcPct val="150000"/>
-                        </a:lnSpc>
-                        <a:buNone/>
-                        <a:defRPr/>
-                      </a:pPr>
-                      <a:r>
-                        <a:rPr lang="en-US" sz="1000" b="1" kern="1200" dirty="0">
-                          <a:solidFill>
-                            <a:schemeClr val="dk1"/>
-                          </a:solidFill>
-                          <a:latin typeface="+mn-lt"/>
-                          <a:ea typeface="+mn-ea"/>
-                          <a:cs typeface="+mn-cs"/>
-                        </a:rPr>
-                        <a:t>Iterator Invalidation</a:t>
-                      </a:r>
-                    </a:p>
-                    <a:p>
-                      <a:pPr marL="0" indent="0">
-                        <a:buNone/>
-                        <a:defRPr/>
-                      </a:pPr>
-                      <a:r>
-                        <a:rPr lang="en-US" sz="1000" b="1" dirty="0">
-                          <a:solidFill>
-                            <a:prstClr val="black"/>
-                          </a:solidFill>
-                          <a:hlinkClick r:id="rId5"/>
-                        </a:rPr>
-                        <a:t>https://www.geeksforgeeks.org/iterator-invalidation-cpp/</a:t>
-                      </a:r>
-                      <a:endParaRPr lang="en-US" sz="1000" b="1" dirty="0">
-                        <a:solidFill>
-                          <a:prstClr val="black"/>
-                        </a:solidFill>
-                      </a:endParaRPr>
-                    </a:p>
-                    <a:p>
-                      <a:pPr marL="0" indent="0">
-                        <a:buNone/>
-                        <a:defRPr/>
-                      </a:pPr>
-                      <a:r>
-                        <a:rPr lang="en-US" sz="1000" b="1" dirty="0">
-                          <a:solidFill>
-                            <a:prstClr val="black"/>
-                          </a:solidFill>
-                          <a:hlinkClick r:id="rId6"/>
-                        </a:rPr>
-                        <a:t>https://en.cppreference.com/w/cpp/container/vector/reserve</a:t>
-                      </a:r>
-                      <a:endParaRPr lang="en-US" sz="1000" b="1" dirty="0">
-                        <a:solidFill>
-                          <a:prstClr val="black"/>
-                        </a:solidFill>
-                      </a:endParaRPr>
-                    </a:p>
-                    <a:p>
-                      <a:pPr marL="0" indent="0">
-                        <a:buNone/>
-                        <a:defRPr/>
-                      </a:pPr>
-                      <a:r>
-                        <a:rPr lang="en-US" sz="1000" b="1" dirty="0">
-                          <a:solidFill>
-                            <a:prstClr val="black"/>
-                          </a:solidFill>
-                          <a:hlinkClick r:id="rId7"/>
-                        </a:rPr>
-                        <a:t>https://stackoverflow.com/a/6438087/4168707</a:t>
-                      </a:r>
-                      <a:endParaRPr lang="en-US" sz="1000" b="1" dirty="0">
-                        <a:solidFill>
-                          <a:prstClr val="black"/>
-                        </a:solidFill>
-                        <a:latin typeface="+mn-lt"/>
-                      </a:endParaRPr>
-                    </a:p>
-                  </a:txBody>
-                  <a:tcPr>
-                    <a:lnL w="12700" cap="flat" cmpd="sng" algn="ctr">
-                      <a:solidFill>
-                        <a:schemeClr val="tx1"/>
-                      </a:solidFill>
-                      <a:prstDash val="solid"/>
-                      <a:round/>
-                      <a:headEnd type="none" w="med" len="med"/>
-                      <a:tailEnd type="none" w="med" len="med"/>
-                    </a:lnL>
-                    <a:lnR w="12700" cap="flat" cmpd="sng" algn="ctr">
-                      <a:solidFill>
-                        <a:schemeClr val="tx1"/>
-                      </a:solidFill>
-                      <a:prstDash val="solid"/>
-                      <a:round/>
-                      <a:headEnd type="none" w="med" len="med"/>
-                      <a:tailEnd type="none" w="med" len="med"/>
-                    </a:lnR>
-                    <a:lnT w="12700" cap="flat" cmpd="sng" algn="ctr">
-                      <a:solidFill>
-                        <a:schemeClr val="tx1"/>
-                      </a:solidFill>
-                      <a:prstDash val="solid"/>
-                      <a:round/>
-                      <a:headEnd type="none" w="med" len="med"/>
-                      <a:tailEnd type="none" w="med" len="med"/>
-                    </a:lnT>
-                    <a:lnB w="12700" cap="flat" cmpd="sng" algn="ctr">
-                      <a:solidFill>
-                        <a:schemeClr val="tx1"/>
-                      </a:solidFill>
-                      <a:prstDash val="solid"/>
-                      <a:round/>
-                      <a:headEnd type="none" w="med" len="med"/>
-                      <a:tailEnd type="none" w="med" len="med"/>
-                    </a:lnB>
-                    <a:lnTlToBr w="12700" cmpd="sng">
-                      <a:noFill/>
-                      <a:prstDash val="solid"/>
-                    </a:lnTlToBr>
-                    <a:lnBlToTr w="12700" cmpd="sng">
-                      <a:noFill/>
-                      <a:prstDash val="solid"/>
-                    </a:lnBlToTr>
-                    <a:solidFill>
-                      <a:schemeClr val="accent4">
-                        <a:lumMod val="20000"/>
-                        <a:lumOff val="80000"/>
-                      </a:schemeClr>
-                    </a:solidFill>
-                  </a:tcPr>
-                </a:tc>
-                <a:extLst>
-                  <a:ext uri="{0D108BD9-81ED-4DB2-BD59-A6C34878D82A}">
-                    <a16:rowId xmlns:a16="http://schemas.microsoft.com/office/drawing/2014/main" val="3697275498"/>
-                  </a:ext>
-                </a:extLst>
-              </a:tr>
-              <a:tr h="370840">
-                <a:tc>
-                  <a:txBody>
-                    <a:bodyPr/>
-                    <a:lstStyle/>
-                    <a:p>
-                      <a:pPr marL="0" indent="0" algn="l" defTabSz="914400" rtl="0" eaLnBrk="1" latinLnBrk="0" hangingPunct="1">
-                        <a:lnSpc>
-                          <a:spcPct val="150000"/>
-                        </a:lnSpc>
-                        <a:buNone/>
-                        <a:defRPr/>
-                      </a:pPr>
-                      <a:r>
-                        <a:rPr lang="en-US" sz="1000" b="1" kern="1200" noProof="0" dirty="0">
-                          <a:solidFill>
-                            <a:schemeClr val="dk1"/>
-                          </a:solidFill>
-                          <a:latin typeface="+mn-lt"/>
-                          <a:ea typeface="+mn-ea"/>
-                          <a:cs typeface="+mn-cs"/>
-                        </a:rPr>
-                        <a:t>Vector – </a:t>
-                      </a:r>
-                      <a:r>
-                        <a:rPr lang="en-US" sz="1000" b="1" kern="1200" dirty="0">
-                          <a:solidFill>
-                            <a:schemeClr val="dk1"/>
-                          </a:solidFill>
-                          <a:latin typeface="+mn-lt"/>
-                          <a:ea typeface="+mn-ea"/>
-                          <a:cs typeface="+mn-cs"/>
-                        </a:rPr>
-                        <a:t>m</a:t>
-                      </a:r>
-                      <a:r>
-                        <a:rPr lang="en-US" sz="1000" b="1" kern="1200" noProof="0" dirty="0" err="1">
-                          <a:solidFill>
-                            <a:schemeClr val="dk1"/>
-                          </a:solidFill>
-                          <a:latin typeface="+mn-lt"/>
-                          <a:ea typeface="+mn-ea"/>
-                          <a:cs typeface="+mn-cs"/>
-                        </a:rPr>
-                        <a:t>ax_size</a:t>
-                      </a:r>
-                      <a:endParaRPr lang="en-US" sz="1000" b="1" kern="1200" noProof="0" dirty="0">
-                        <a:solidFill>
-                          <a:schemeClr val="dk1"/>
-                        </a:solidFill>
-                        <a:latin typeface="+mn-lt"/>
-                        <a:ea typeface="+mn-ea"/>
-                        <a:cs typeface="+mn-cs"/>
-                      </a:endParaRPr>
-                    </a:p>
-                    <a:p>
-                      <a:pPr marL="0" indent="0">
-                        <a:buNone/>
-                        <a:defRPr/>
-                      </a:pPr>
-                      <a:r>
-                        <a:rPr kumimoji="0" lang="en-US" sz="1000" b="1" u="none" strike="noStrike" kern="1200" cap="none" spc="0" normalizeH="0" baseline="0" noProof="0" dirty="0">
-                          <a:ln>
-                            <a:noFill/>
-                          </a:ln>
-                          <a:solidFill>
-                            <a:prstClr val="black"/>
-                          </a:solidFill>
-                          <a:effectLst/>
-                          <a:uLnTx/>
-                          <a:uFillTx/>
-                          <a:hlinkClick r:id="rId8"/>
-                        </a:rPr>
-                        <a:t>https://qr.ae/pGclP6</a:t>
-                      </a:r>
-                      <a:endParaRPr kumimoji="0" lang="en-US" sz="1000" b="1" u="none" strike="noStrike" kern="1200" cap="none" spc="0" normalizeH="0" baseline="0" noProof="0" dirty="0">
-                        <a:ln>
-                          <a:noFill/>
-                        </a:ln>
-                        <a:solidFill>
-                          <a:prstClr val="black"/>
-                        </a:solidFill>
-                        <a:effectLst/>
-                        <a:uLnTx/>
-                        <a:uFillTx/>
-                      </a:endParaRPr>
-                    </a:p>
-                    <a:p>
-                      <a:pPr marL="0" indent="0">
-                        <a:buNone/>
-                        <a:defRPr/>
-                      </a:pPr>
-                      <a:r>
-                        <a:rPr lang="en-US" sz="1000" b="1" dirty="0">
-                          <a:solidFill>
-                            <a:prstClr val="black"/>
-                          </a:solidFill>
-                          <a:hlinkClick r:id="rId9"/>
-                        </a:rPr>
-                        <a:t>https://stackoverflow.com/a/3813203/4168707</a:t>
-                      </a:r>
-                      <a:endParaRPr lang="en-US" sz="1000" b="1" dirty="0">
-                        <a:solidFill>
-                          <a:prstClr val="black"/>
-                        </a:solidFill>
-                      </a:endParaRPr>
-                    </a:p>
-                    <a:p>
-                      <a:pPr marL="0" indent="0">
-                        <a:buNone/>
-                        <a:defRPr/>
-                      </a:pPr>
-                      <a:r>
-                        <a:rPr lang="en-US" sz="1000" b="1" dirty="0">
-                          <a:solidFill>
-                            <a:prstClr val="black"/>
-                          </a:solidFill>
-                          <a:hlinkClick r:id="rId10"/>
-                        </a:rPr>
-                        <a:t>https://stackoverflow.com/a/2664094/4168707</a:t>
-                      </a:r>
-                      <a:endParaRPr lang="en-US" sz="1000" b="1" dirty="0">
-                        <a:solidFill>
-                          <a:prstClr val="black"/>
-                        </a:solidFill>
-                        <a:latin typeface="+mn-lt"/>
-                      </a:endParaRPr>
-                    </a:p>
-                  </a:txBody>
-                  <a:tcPr>
-                    <a:lnL w="12700" cap="flat" cmpd="sng" algn="ctr">
-                      <a:solidFill>
-                        <a:schemeClr val="tx1"/>
-                      </a:solidFill>
-                      <a:prstDash val="solid"/>
-                      <a:round/>
-                      <a:headEnd type="none" w="med" len="med"/>
-                      <a:tailEnd type="none" w="med" len="med"/>
-                    </a:lnL>
-                    <a:lnR w="12700" cap="flat" cmpd="sng" algn="ctr">
-                      <a:solidFill>
-                        <a:schemeClr val="tx1"/>
-                      </a:solidFill>
-                      <a:prstDash val="solid"/>
-                      <a:round/>
-                      <a:headEnd type="none" w="med" len="med"/>
-                      <a:tailEnd type="none" w="med" len="med"/>
-                    </a:lnR>
-                    <a:lnT w="12700" cap="flat" cmpd="sng" algn="ctr">
-                      <a:solidFill>
-                        <a:schemeClr val="tx1"/>
-                      </a:solidFill>
-                      <a:prstDash val="solid"/>
-                      <a:round/>
-                      <a:headEnd type="none" w="med" len="med"/>
-                      <a:tailEnd type="none" w="med" len="med"/>
-                    </a:lnT>
-                    <a:lnB w="12700" cap="flat" cmpd="sng" algn="ctr">
-                      <a:solidFill>
-                        <a:schemeClr val="tx1"/>
-                      </a:solidFill>
-                      <a:prstDash val="solid"/>
-                      <a:round/>
-                      <a:headEnd type="none" w="med" len="med"/>
-                      <a:tailEnd type="none" w="med" len="med"/>
-                    </a:lnB>
-                    <a:lnTlToBr w="12700" cmpd="sng">
-                      <a:noFill/>
-                      <a:prstDash val="solid"/>
-                    </a:lnTlToBr>
-                    <a:lnBlToTr w="12700" cmpd="sng">
-                      <a:noFill/>
-                      <a:prstDash val="solid"/>
-                    </a:lnBlToTr>
-                    <a:solidFill>
-                      <a:schemeClr val="accent4">
-                        <a:lumMod val="40000"/>
-                        <a:lumOff val="60000"/>
-                      </a:schemeClr>
-                    </a:solidFill>
-                  </a:tcPr>
-                </a:tc>
-                <a:tc>
-                  <a:txBody>
-                    <a:bodyPr/>
-                    <a:lstStyle/>
-                    <a:p>
-                      <a:pPr marL="0" indent="0" algn="l" defTabSz="914400" rtl="0" eaLnBrk="1" latinLnBrk="0" hangingPunct="1">
-                        <a:lnSpc>
-                          <a:spcPct val="150000"/>
-                        </a:lnSpc>
-                        <a:buNone/>
-                        <a:defRPr/>
-                      </a:pPr>
-                      <a:r>
-                        <a:rPr lang="en-US" sz="1000" b="1" u="none" kern="1200" dirty="0">
-                          <a:solidFill>
-                            <a:schemeClr val="dk1"/>
-                          </a:solidFill>
-                          <a:latin typeface="+mn-lt"/>
-                          <a:ea typeface="+mn-ea"/>
-                          <a:cs typeface="+mn-cs"/>
-                        </a:rPr>
-                        <a:t>Vector - Reserve</a:t>
-                      </a:r>
-                      <a:endParaRPr lang="en-US" sz="1000" b="1" u="none" kern="1200" dirty="0">
-                        <a:solidFill>
-                          <a:schemeClr val="dk1"/>
-                        </a:solidFill>
-                        <a:latin typeface="+mn-lt"/>
-                        <a:ea typeface="+mn-ea"/>
-                        <a:cs typeface="+mn-cs"/>
-                        <a:hlinkClick r:id="rId6">
-                          <a:extLst>
-                            <a:ext uri="{A12FA001-AC4F-418D-AE19-62706E023703}">
-                              <ahyp:hlinkClr xmlns:ahyp="http://schemas.microsoft.com/office/drawing/2018/hyperlinkcolor" val="tx"/>
-                            </a:ext>
-                          </a:extLst>
-                        </a:hlinkClick>
-                      </a:endParaRPr>
-                    </a:p>
-                    <a:p>
-                      <a:r>
-                        <a:rPr lang="en-US" sz="1000" b="1" dirty="0">
-                          <a:hlinkClick r:id="rId6"/>
-                        </a:rPr>
-                        <a:t>https://en.cppreference.com/w/cpp/container/vector/reserve</a:t>
-                      </a:r>
-                      <a:endParaRPr lang="en-US" sz="1000" b="1" dirty="0"/>
-                    </a:p>
-                    <a:p>
-                      <a:endParaRPr lang="en-US" sz="1000" b="1" dirty="0"/>
-                    </a:p>
-                  </a:txBody>
-                  <a:tcPr>
-                    <a:lnL w="12700" cap="flat" cmpd="sng" algn="ctr">
-                      <a:solidFill>
-                        <a:schemeClr val="tx1"/>
-                      </a:solidFill>
-                      <a:prstDash val="solid"/>
-                      <a:round/>
-                      <a:headEnd type="none" w="med" len="med"/>
-                      <a:tailEnd type="none" w="med" len="med"/>
-                    </a:lnL>
-                    <a:lnR w="12700" cap="flat" cmpd="sng" algn="ctr">
-                      <a:solidFill>
-                        <a:schemeClr val="tx1"/>
-                      </a:solidFill>
-                      <a:prstDash val="solid"/>
-                      <a:round/>
-                      <a:headEnd type="none" w="med" len="med"/>
-                      <a:tailEnd type="none" w="med" len="med"/>
-                    </a:lnR>
-                    <a:lnT w="12700" cap="flat" cmpd="sng" algn="ctr">
-                      <a:solidFill>
-                        <a:schemeClr val="tx1"/>
-                      </a:solidFill>
-                      <a:prstDash val="solid"/>
-                      <a:round/>
-                      <a:headEnd type="none" w="med" len="med"/>
-                      <a:tailEnd type="none" w="med" len="med"/>
-                    </a:lnT>
-                    <a:lnB w="12700" cap="flat" cmpd="sng" algn="ctr">
-                      <a:solidFill>
-                        <a:schemeClr val="tx1"/>
-                      </a:solidFill>
-                      <a:prstDash val="solid"/>
-                      <a:round/>
-                      <a:headEnd type="none" w="med" len="med"/>
-                      <a:tailEnd type="none" w="med" len="med"/>
-                    </a:lnB>
-                    <a:lnTlToBr w="12700" cmpd="sng">
-                      <a:noFill/>
-                      <a:prstDash val="solid"/>
-                    </a:lnTlToBr>
-                    <a:lnBlToTr w="12700" cmpd="sng">
-                      <a:noFill/>
-                      <a:prstDash val="solid"/>
-                    </a:lnBlToTr>
-                    <a:solidFill>
-                      <a:schemeClr val="accent4">
-                        <a:lumMod val="40000"/>
-                        <a:lumOff val="60000"/>
-                      </a:schemeClr>
-                    </a:solidFill>
-                  </a:tcPr>
-                </a:tc>
-                <a:extLst>
-                  <a:ext uri="{0D108BD9-81ED-4DB2-BD59-A6C34878D82A}">
-                    <a16:rowId xmlns:a16="http://schemas.microsoft.com/office/drawing/2014/main" val="2334344078"/>
-                  </a:ext>
-                </a:extLst>
-              </a:tr>
-              <a:tr h="370840">
-                <a:tc>
-                  <a:txBody>
-                    <a:bodyPr/>
-                    <a:lstStyle/>
-                    <a:p>
-                      <a:pPr marL="0" indent="0" algn="l" defTabSz="914400" rtl="0" eaLnBrk="1" latinLnBrk="0" hangingPunct="1">
-                        <a:lnSpc>
-                          <a:spcPct val="150000"/>
-                        </a:lnSpc>
-                        <a:buNone/>
-                        <a:defRPr/>
-                      </a:pPr>
-                      <a:r>
-                        <a:rPr lang="en-US" sz="1000" b="1" kern="1200" noProof="0" dirty="0">
-                          <a:solidFill>
-                            <a:schemeClr val="dk1"/>
-                          </a:solidFill>
-                          <a:latin typeface="+mn-lt"/>
-                          <a:ea typeface="+mn-ea"/>
-                          <a:cs typeface="+mn-cs"/>
-                        </a:rPr>
-                        <a:t>Vector – </a:t>
-                      </a:r>
-                      <a:r>
-                        <a:rPr lang="en-US" sz="1000" b="1" kern="1200" dirty="0" err="1">
-                          <a:solidFill>
-                            <a:schemeClr val="dk1"/>
-                          </a:solidFill>
-                          <a:latin typeface="+mn-lt"/>
-                          <a:ea typeface="+mn-ea"/>
-                          <a:cs typeface="+mn-cs"/>
-                        </a:rPr>
-                        <a:t>shrink_to</a:t>
-                      </a:r>
-                      <a:r>
-                        <a:rPr lang="en-US" sz="1000" b="1" kern="1200" noProof="0" dirty="0">
-                          <a:solidFill>
-                            <a:schemeClr val="dk1"/>
-                          </a:solidFill>
-                          <a:latin typeface="+mn-lt"/>
-                          <a:ea typeface="+mn-ea"/>
-                          <a:cs typeface="+mn-cs"/>
-                        </a:rPr>
-                        <a:t>_fit</a:t>
-                      </a:r>
-                      <a:endParaRPr lang="en-US" sz="1000" b="1" kern="1200" dirty="0">
-                        <a:solidFill>
-                          <a:schemeClr val="dk1"/>
-                        </a:solidFill>
-                        <a:latin typeface="+mn-lt"/>
-                        <a:ea typeface="+mn-ea"/>
-                        <a:cs typeface="+mn-cs"/>
-                      </a:endParaRPr>
-                    </a:p>
-                    <a:p>
-                      <a:pPr marL="0" indent="0">
-                        <a:buNone/>
-                        <a:defRPr/>
-                      </a:pPr>
-                      <a:r>
-                        <a:rPr lang="en-US" sz="1000" b="1" dirty="0">
-                          <a:solidFill>
-                            <a:prstClr val="black"/>
-                          </a:solidFill>
-                          <a:hlinkClick r:id="rId11"/>
-                        </a:rPr>
-                        <a:t>https://en.cppreference.com/w/cpp/container/vector/shrink_to_fit</a:t>
-                      </a:r>
-                      <a:endParaRPr lang="en-US" sz="1000" b="1" dirty="0">
-                        <a:solidFill>
-                          <a:prstClr val="black"/>
-                        </a:solidFill>
-                      </a:endParaRPr>
-                    </a:p>
-                    <a:p>
-                      <a:pPr marL="0" indent="0">
-                        <a:buNone/>
-                        <a:defRPr/>
-                      </a:pPr>
-                      <a:r>
-                        <a:rPr lang="en-US" sz="1000" b="1" dirty="0">
-                          <a:solidFill>
-                            <a:prstClr val="black"/>
-                          </a:solidFill>
-                          <a:hlinkClick r:id="rId12"/>
-                        </a:rPr>
-                        <a:t>https://stackoverflow.com/q/16518533/4168707</a:t>
-                      </a:r>
-                      <a:endParaRPr lang="en-US" sz="1000" b="1" dirty="0">
-                        <a:solidFill>
-                          <a:prstClr val="black"/>
-                        </a:solidFill>
-                        <a:latin typeface="+mn-lt"/>
-                      </a:endParaRPr>
-                    </a:p>
-                  </a:txBody>
-                  <a:tcPr>
-                    <a:lnL w="12700" cap="flat" cmpd="sng" algn="ctr">
-                      <a:solidFill>
-                        <a:schemeClr val="tx1"/>
-                      </a:solidFill>
-                      <a:prstDash val="solid"/>
-                      <a:round/>
-                      <a:headEnd type="none" w="med" len="med"/>
-                      <a:tailEnd type="none" w="med" len="med"/>
-                    </a:lnL>
-                    <a:lnR w="12700" cap="flat" cmpd="sng" algn="ctr">
-                      <a:solidFill>
-                        <a:schemeClr val="tx1"/>
-                      </a:solidFill>
-                      <a:prstDash val="solid"/>
-                      <a:round/>
-                      <a:headEnd type="none" w="med" len="med"/>
-                      <a:tailEnd type="none" w="med" len="med"/>
-                    </a:lnR>
-                    <a:lnT w="12700" cap="flat" cmpd="sng" algn="ctr">
-                      <a:solidFill>
-                        <a:schemeClr val="tx1"/>
-                      </a:solidFill>
-                      <a:prstDash val="solid"/>
-                      <a:round/>
-                      <a:headEnd type="none" w="med" len="med"/>
-                      <a:tailEnd type="none" w="med" len="med"/>
-                    </a:lnT>
-                    <a:lnB w="12700" cap="flat" cmpd="sng" algn="ctr">
-                      <a:solidFill>
-                        <a:schemeClr val="tx1"/>
-                      </a:solidFill>
-                      <a:prstDash val="solid"/>
-                      <a:round/>
-                      <a:headEnd type="none" w="med" len="med"/>
-                      <a:tailEnd type="none" w="med" len="med"/>
-                    </a:lnB>
-                    <a:lnTlToBr w="12700" cmpd="sng">
-                      <a:noFill/>
-                      <a:prstDash val="solid"/>
-                    </a:lnTlToBr>
-                    <a:lnBlToTr w="12700" cmpd="sng">
-                      <a:noFill/>
-                      <a:prstDash val="solid"/>
-                    </a:lnBlToTr>
-                    <a:solidFill>
-                      <a:schemeClr val="accent4">
-                        <a:lumMod val="20000"/>
-                        <a:lumOff val="80000"/>
-                      </a:schemeClr>
-                    </a:solidFill>
-                  </a:tcPr>
-                </a:tc>
-                <a:tc>
-                  <a:txBody>
-                    <a:bodyPr/>
-                    <a:lstStyle/>
-                    <a:p>
-                      <a:pPr marL="0" indent="0" algn="l" defTabSz="914400" rtl="0" eaLnBrk="1" latinLnBrk="0" hangingPunct="1">
-                        <a:lnSpc>
-                          <a:spcPct val="150000"/>
-                        </a:lnSpc>
-                        <a:buNone/>
-                        <a:defRPr/>
-                      </a:pPr>
-                      <a:r>
-                        <a:rPr lang="en-US" sz="1000" b="1" u="none" kern="1200" dirty="0">
-                          <a:solidFill>
-                            <a:schemeClr val="dk1"/>
-                          </a:solidFill>
-                          <a:latin typeface="+mn-lt"/>
-                          <a:ea typeface="+mn-ea"/>
-                          <a:cs typeface="+mn-cs"/>
-                        </a:rPr>
-                        <a:t>Vector – Assign</a:t>
-                      </a:r>
-                    </a:p>
-                    <a:p>
-                      <a:r>
-                        <a:rPr lang="en-US" sz="1000" b="1" dirty="0">
-                          <a:hlinkClick r:id="rId13"/>
-                        </a:rPr>
-                        <a:t>https://www.geeksforgeeks.org/vector-assign-in-c-stl/</a:t>
-                      </a:r>
-                      <a:endParaRPr lang="en-US" sz="1000" b="1" dirty="0"/>
-                    </a:p>
-                    <a:p>
-                      <a:r>
-                        <a:rPr lang="en-US" sz="1000" b="1" dirty="0">
-                          <a:hlinkClick r:id="rId14"/>
-                        </a:rPr>
-                        <a:t>https://en.cppreference.com/w/cpp/container/vector/assign</a:t>
-                      </a:r>
-                      <a:endParaRPr lang="en-US" sz="1000" b="1" dirty="0"/>
-                    </a:p>
-                    <a:p>
-                      <a:endParaRPr lang="en-US" sz="1000" b="1" dirty="0"/>
-                    </a:p>
-                    <a:p>
-                      <a:endParaRPr lang="en-US" sz="1000" b="1" dirty="0"/>
-                    </a:p>
-                  </a:txBody>
-                  <a:tcPr>
-                    <a:lnL w="12700" cap="flat" cmpd="sng" algn="ctr">
-                      <a:solidFill>
-                        <a:schemeClr val="tx1"/>
-                      </a:solidFill>
-                      <a:prstDash val="solid"/>
-                      <a:round/>
-                      <a:headEnd type="none" w="med" len="med"/>
-                      <a:tailEnd type="none" w="med" len="med"/>
-                    </a:lnL>
-                    <a:lnR w="12700" cap="flat" cmpd="sng" algn="ctr">
-                      <a:solidFill>
-                        <a:schemeClr val="tx1"/>
-                      </a:solidFill>
-                      <a:prstDash val="solid"/>
-                      <a:round/>
-                      <a:headEnd type="none" w="med" len="med"/>
-                      <a:tailEnd type="none" w="med" len="med"/>
-                    </a:lnR>
-                    <a:lnT w="12700" cap="flat" cmpd="sng" algn="ctr">
-                      <a:solidFill>
-                        <a:schemeClr val="tx1"/>
-                      </a:solidFill>
-                      <a:prstDash val="solid"/>
-                      <a:round/>
-                      <a:headEnd type="none" w="med" len="med"/>
-                      <a:tailEnd type="none" w="med" len="med"/>
-                    </a:lnT>
-                    <a:lnB w="12700" cap="flat" cmpd="sng" algn="ctr">
-                      <a:solidFill>
-                        <a:schemeClr val="tx1"/>
-                      </a:solidFill>
-                      <a:prstDash val="solid"/>
-                      <a:round/>
-                      <a:headEnd type="none" w="med" len="med"/>
-                      <a:tailEnd type="none" w="med" len="med"/>
-                    </a:lnB>
-                    <a:lnTlToBr w="12700" cmpd="sng">
-                      <a:noFill/>
-                      <a:prstDash val="solid"/>
-                    </a:lnTlToBr>
-                    <a:lnBlToTr w="12700" cmpd="sng">
-                      <a:noFill/>
-                      <a:prstDash val="solid"/>
-                    </a:lnBlToTr>
-                    <a:solidFill>
-                      <a:schemeClr val="accent4">
-                        <a:lumMod val="20000"/>
-                        <a:lumOff val="80000"/>
-                      </a:schemeClr>
-                    </a:solidFill>
-                  </a:tcPr>
-                </a:tc>
-                <a:extLst>
-                  <a:ext uri="{0D108BD9-81ED-4DB2-BD59-A6C34878D82A}">
-                    <a16:rowId xmlns:a16="http://schemas.microsoft.com/office/drawing/2014/main" val="3116449768"/>
-                  </a:ext>
-                </a:extLst>
-              </a:tr>
-              <a:tr h="370840">
-                <a:tc>
-                  <a:txBody>
-                    <a:bodyPr/>
-                    <a:lstStyle/>
-                    <a:p>
-                      <a:pPr marL="0" indent="0">
-                        <a:buNone/>
-                        <a:defRPr/>
-                      </a:pPr>
-                      <a:r>
-                        <a:rPr lang="en-US" sz="1000" b="1" dirty="0">
-                          <a:solidFill>
-                            <a:prstClr val="black"/>
-                          </a:solidFill>
-                          <a:latin typeface="+mn-lt"/>
-                        </a:rPr>
-                        <a:t>String</a:t>
-                      </a:r>
-                    </a:p>
-                    <a:p>
-                      <a:pPr marL="0" indent="0">
-                        <a:buNone/>
-                        <a:defRPr/>
-                      </a:pPr>
-                      <a:r>
-                        <a:rPr lang="en-US" sz="1000" b="1" dirty="0">
-                          <a:solidFill>
-                            <a:prstClr val="black"/>
-                          </a:solidFill>
-                          <a:latin typeface="+mn-lt"/>
-                          <a:hlinkClick r:id="rId15"/>
-                        </a:rPr>
-                        <a:t>https://www.geeksforgeeks.org/stdstring-class-in-c/</a:t>
-                      </a:r>
-                      <a:endParaRPr lang="en-US" sz="1000" b="1" dirty="0">
-                        <a:solidFill>
-                          <a:prstClr val="black"/>
-                        </a:solidFill>
-                        <a:latin typeface="+mn-lt"/>
-                      </a:endParaRPr>
-                    </a:p>
-                    <a:p>
-                      <a:pPr marL="0" indent="0">
-                        <a:buNone/>
-                        <a:defRPr/>
-                      </a:pPr>
-                      <a:endParaRPr lang="en-US" sz="1000" b="1" dirty="0">
-                        <a:solidFill>
-                          <a:prstClr val="black"/>
-                        </a:solidFill>
-                        <a:latin typeface="+mn-lt"/>
-                      </a:endParaRPr>
-                    </a:p>
-                  </a:txBody>
-                  <a:tcPr>
-                    <a:lnL w="12700" cap="flat" cmpd="sng" algn="ctr">
-                      <a:solidFill>
-                        <a:schemeClr val="tx1"/>
-                      </a:solidFill>
-                      <a:prstDash val="solid"/>
-                      <a:round/>
-                      <a:headEnd type="none" w="med" len="med"/>
-                      <a:tailEnd type="none" w="med" len="med"/>
-                    </a:lnL>
-                    <a:lnR w="12700" cap="flat" cmpd="sng" algn="ctr">
-                      <a:solidFill>
-                        <a:schemeClr val="tx1"/>
-                      </a:solidFill>
-                      <a:prstDash val="solid"/>
-                      <a:round/>
-                      <a:headEnd type="none" w="med" len="med"/>
-                      <a:tailEnd type="none" w="med" len="med"/>
-                    </a:lnR>
-                    <a:lnT w="12700" cap="flat" cmpd="sng" algn="ctr">
-                      <a:solidFill>
-                        <a:schemeClr val="tx1"/>
-                      </a:solidFill>
-                      <a:prstDash val="solid"/>
-                      <a:round/>
-                      <a:headEnd type="none" w="med" len="med"/>
-                      <a:tailEnd type="none" w="med" len="med"/>
-                    </a:lnT>
-                    <a:lnB w="12700" cap="flat" cmpd="sng" algn="ctr">
-                      <a:solidFill>
-                        <a:schemeClr val="tx1"/>
-                      </a:solidFill>
-                      <a:prstDash val="solid"/>
-                      <a:round/>
-                      <a:headEnd type="none" w="med" len="med"/>
-                      <a:tailEnd type="none" w="med" len="med"/>
-                    </a:lnB>
-                    <a:lnTlToBr w="12700" cmpd="sng">
-                      <a:noFill/>
-                      <a:prstDash val="solid"/>
-                    </a:lnTlToBr>
-                    <a:lnBlToTr w="12700" cmpd="sng">
-                      <a:noFill/>
-                      <a:prstDash val="solid"/>
-                    </a:lnBlToTr>
-                    <a:solidFill>
-                      <a:schemeClr val="accent4">
-                        <a:lumMod val="40000"/>
-                        <a:lumOff val="60000"/>
-                      </a:schemeClr>
-                    </a:solidFill>
-                  </a:tcPr>
-                </a:tc>
-                <a:tc>
-                  <a:txBody>
-                    <a:bodyPr/>
-                    <a:lstStyle/>
-                    <a:p>
-                      <a:r>
-                        <a:rPr lang="en-US" sz="1000" b="1" dirty="0"/>
-                        <a:t>String – Single Quote vs Double Quotes</a:t>
-                      </a:r>
-                    </a:p>
-                    <a:p>
-                      <a:r>
-                        <a:rPr lang="en-US" sz="1000" b="1" dirty="0">
-                          <a:hlinkClick r:id="rId16"/>
-                        </a:rPr>
-                        <a:t>https://stackoverflow.com/a/3683613/4168707</a:t>
-                      </a:r>
-                      <a:endParaRPr lang="en-US" sz="1000" b="1" dirty="0"/>
-                    </a:p>
-                    <a:p>
-                      <a:endParaRPr lang="en-US" sz="1000" b="1" dirty="0"/>
-                    </a:p>
-                  </a:txBody>
-                  <a:tcPr>
-                    <a:lnL w="12700" cap="flat" cmpd="sng" algn="ctr">
-                      <a:solidFill>
-                        <a:schemeClr val="tx1"/>
-                      </a:solidFill>
-                      <a:prstDash val="solid"/>
-                      <a:round/>
-                      <a:headEnd type="none" w="med" len="med"/>
-                      <a:tailEnd type="none" w="med" len="med"/>
-                    </a:lnL>
-                    <a:lnR w="12700" cap="flat" cmpd="sng" algn="ctr">
-                      <a:solidFill>
-                        <a:schemeClr val="tx1"/>
-                      </a:solidFill>
-                      <a:prstDash val="solid"/>
-                      <a:round/>
-                      <a:headEnd type="none" w="med" len="med"/>
-                      <a:tailEnd type="none" w="med" len="med"/>
-                    </a:lnR>
-                    <a:lnT w="12700" cap="flat" cmpd="sng" algn="ctr">
-                      <a:solidFill>
-                        <a:schemeClr val="tx1"/>
-                      </a:solidFill>
-                      <a:prstDash val="solid"/>
-                      <a:round/>
-                      <a:headEnd type="none" w="med" len="med"/>
-                      <a:tailEnd type="none" w="med" len="med"/>
-                    </a:lnT>
-                    <a:lnB w="12700" cap="flat" cmpd="sng" algn="ctr">
-                      <a:solidFill>
-                        <a:schemeClr val="tx1"/>
-                      </a:solidFill>
-                      <a:prstDash val="solid"/>
-                      <a:round/>
-                      <a:headEnd type="none" w="med" len="med"/>
-                      <a:tailEnd type="none" w="med" len="med"/>
-                    </a:lnB>
-                    <a:lnTlToBr w="12700" cmpd="sng">
-                      <a:noFill/>
-                      <a:prstDash val="solid"/>
-                    </a:lnTlToBr>
-                    <a:lnBlToTr w="12700" cmpd="sng">
-                      <a:noFill/>
-                      <a:prstDash val="solid"/>
-                    </a:lnBlToTr>
-                    <a:solidFill>
-                      <a:schemeClr val="accent4">
-                        <a:lumMod val="40000"/>
-                        <a:lumOff val="60000"/>
-                      </a:schemeClr>
-                    </a:solidFill>
-                  </a:tcPr>
-                </a:tc>
-                <a:extLst>
-                  <a:ext uri="{0D108BD9-81ED-4DB2-BD59-A6C34878D82A}">
-                    <a16:rowId xmlns:a16="http://schemas.microsoft.com/office/drawing/2014/main" val="927941286"/>
-                  </a:ext>
-                </a:extLst>
-              </a:tr>
-              <a:tr h="370840">
-                <a:tc>
-                  <a:txBody>
-                    <a:bodyPr/>
-                    <a:lstStyle/>
-                    <a:p>
-                      <a:pPr marL="0" indent="0">
-                        <a:buNone/>
-                        <a:defRPr/>
-                      </a:pPr>
-                      <a:endParaRPr lang="en-US" sz="1000" b="1" dirty="0">
-                        <a:solidFill>
-                          <a:prstClr val="black"/>
-                        </a:solidFill>
-                        <a:latin typeface="+mn-lt"/>
-                      </a:endParaRPr>
-                    </a:p>
-                  </a:txBody>
-                  <a:tcPr>
-                    <a:lnL w="12700" cap="flat" cmpd="sng" algn="ctr">
-                      <a:solidFill>
-                        <a:schemeClr val="tx1"/>
-                      </a:solidFill>
-                      <a:prstDash val="solid"/>
-                      <a:round/>
-                      <a:headEnd type="none" w="med" len="med"/>
-                      <a:tailEnd type="none" w="med" len="med"/>
-                    </a:lnL>
-                    <a:lnR w="12700" cap="flat" cmpd="sng" algn="ctr">
-                      <a:solidFill>
-                        <a:schemeClr val="tx1"/>
-                      </a:solidFill>
-                      <a:prstDash val="solid"/>
-                      <a:round/>
-                      <a:headEnd type="none" w="med" len="med"/>
-                      <a:tailEnd type="none" w="med" len="med"/>
-                    </a:lnR>
-                    <a:lnT w="12700" cap="flat" cmpd="sng" algn="ctr">
-                      <a:solidFill>
-                        <a:schemeClr val="tx1"/>
-                      </a:solidFill>
-                      <a:prstDash val="solid"/>
-                      <a:round/>
-                      <a:headEnd type="none" w="med" len="med"/>
-                      <a:tailEnd type="none" w="med" len="med"/>
-                    </a:lnT>
-                    <a:lnB w="12700" cap="flat" cmpd="sng" algn="ctr">
-                      <a:solidFill>
-                        <a:schemeClr val="tx1"/>
-                      </a:solidFill>
-                      <a:prstDash val="solid"/>
-                      <a:round/>
-                      <a:headEnd type="none" w="med" len="med"/>
-                      <a:tailEnd type="none" w="med" len="med"/>
-                    </a:lnB>
-                    <a:lnTlToBr w="12700" cmpd="sng">
-                      <a:noFill/>
-                      <a:prstDash val="solid"/>
-                    </a:lnTlToBr>
-                    <a:lnBlToTr w="12700" cmpd="sng">
-                      <a:noFill/>
-                      <a:prstDash val="solid"/>
-                    </a:lnBlToTr>
-                    <a:solidFill>
-                      <a:schemeClr val="accent4">
-                        <a:lumMod val="20000"/>
-                        <a:lumOff val="80000"/>
-                      </a:schemeClr>
-                    </a:solidFill>
-                  </a:tcPr>
-                </a:tc>
-                <a:tc>
-                  <a:txBody>
-                    <a:bodyPr/>
-                    <a:lstStyle/>
-                    <a:p>
-                      <a:endParaRPr lang="en-US" sz="1000" b="1" dirty="0"/>
-                    </a:p>
-                  </a:txBody>
-                  <a:tcPr>
-                    <a:lnL w="12700" cap="flat" cmpd="sng" algn="ctr">
-                      <a:solidFill>
-                        <a:schemeClr val="tx1"/>
-                      </a:solidFill>
-                      <a:prstDash val="solid"/>
-                      <a:round/>
-                      <a:headEnd type="none" w="med" len="med"/>
-                      <a:tailEnd type="none" w="med" len="med"/>
-                    </a:lnL>
-                    <a:lnR w="12700" cap="flat" cmpd="sng" algn="ctr">
-                      <a:solidFill>
-                        <a:schemeClr val="tx1"/>
-                      </a:solidFill>
-                      <a:prstDash val="solid"/>
-                      <a:round/>
-                      <a:headEnd type="none" w="med" len="med"/>
-                      <a:tailEnd type="none" w="med" len="med"/>
-                    </a:lnR>
-                    <a:lnT w="12700" cap="flat" cmpd="sng" algn="ctr">
-                      <a:solidFill>
-                        <a:schemeClr val="tx1"/>
-                      </a:solidFill>
-                      <a:prstDash val="solid"/>
-                      <a:round/>
-                      <a:headEnd type="none" w="med" len="med"/>
-                      <a:tailEnd type="none" w="med" len="med"/>
-                    </a:lnT>
-                    <a:lnB w="12700" cap="flat" cmpd="sng" algn="ctr">
-                      <a:solidFill>
-                        <a:schemeClr val="tx1"/>
-                      </a:solidFill>
-                      <a:prstDash val="solid"/>
-                      <a:round/>
-                      <a:headEnd type="none" w="med" len="med"/>
-                      <a:tailEnd type="none" w="med" len="med"/>
-                    </a:lnB>
-                    <a:lnTlToBr w="12700" cmpd="sng">
-                      <a:noFill/>
-                      <a:prstDash val="solid"/>
-                    </a:lnTlToBr>
-                    <a:lnBlToTr w="12700" cmpd="sng">
-                      <a:noFill/>
-                      <a:prstDash val="solid"/>
-                    </a:lnBlToTr>
-                    <a:solidFill>
-                      <a:schemeClr val="accent4">
-                        <a:lumMod val="20000"/>
-                        <a:lumOff val="80000"/>
-                      </a:schemeClr>
-                    </a:solidFill>
-                  </a:tcPr>
-                </a:tc>
-                <a:extLst>
-                  <a:ext uri="{0D108BD9-81ED-4DB2-BD59-A6C34878D82A}">
-                    <a16:rowId xmlns:a16="http://schemas.microsoft.com/office/drawing/2014/main" val="3762110643"/>
-                  </a:ext>
-                </a:extLst>
-              </a:tr>
-            </a:tbl>
-          </a:graphicData>
-        </a:graphic>
-      </p:graphicFrame>
-    </p:spTree>
-    <p:extLst>
-      <p:ext uri="{BB962C8B-B14F-4D97-AF65-F5344CB8AC3E}">
-        <p14:creationId xmlns:p14="http://schemas.microsoft.com/office/powerpoint/2010/main" val="1241341839"/>
       </p:ext>
     </p:extLst>
   </p:cSld>

</xml_diff>